<commit_message>
excel export and proper random sensor sampling
</commit_message>
<xml_diff>
--- a/Docs/slide_graphs.pptx
+++ b/Docs/slide_graphs.pptx
@@ -3988,7 +3988,6 @@
             <c:showLeaderLines val="0"/>
             <c:extLst>
               <c:ext xmlns:c15="http://schemas.microsoft.com/office/drawing/2012/chart" uri="{CE6537A1-D6FC-4f65-9D91-7224C49458BB}">
-                <c15:layout/>
                 <c15:showLeaderLines val="0"/>
               </c:ext>
             </c:extLst>
@@ -5326,7 +5325,6 @@
     </c:plotArea>
     <c:legend>
       <c:legendPos val="r"/>
-      <c:layout/>
       <c:overlay val="0"/>
     </c:legend>
     <c:plotVisOnly val="1"/>
@@ -5497,7 +5495,6 @@
             <c:showLeaderLines val="0"/>
             <c:extLst>
               <c:ext xmlns:c15="http://schemas.microsoft.com/office/drawing/2012/chart" uri="{CE6537A1-D6FC-4f65-9D91-7224C49458BB}">
-                <c15:layout/>
                 <c15:showLeaderLines val="0"/>
               </c:ext>
             </c:extLst>
@@ -5770,6 +5767,57 @@
               </c:ext>
             </c:extLst>
           </c:dLbls>
+          <c:errBars>
+            <c:errDir val="y"/>
+            <c:errBarType val="both"/>
+            <c:errValType val="cust"/>
+            <c:noEndCap val="0"/>
+            <c:plus>
+              <c:numRef>
+                <c:f>Sheet1!$C$1:$C$9</c:f>
+                <c:numCache>
+                  <c:formatCode>General</c:formatCode>
+                  <c:ptCount val="9"/>
+                  <c:pt idx="0">
+                    <c:v>0</c:v>
+                  </c:pt>
+                  <c:pt idx="1">
+                    <c:v>2.4</c:v>
+                  </c:pt>
+                  <c:pt idx="2">
+                    <c:v>4.4000000000000004</c:v>
+                  </c:pt>
+                  <c:pt idx="3">
+                    <c:v>1.8</c:v>
+                  </c:pt>
+                  <c:pt idx="4">
+                    <c:v>2.8</c:v>
+                  </c:pt>
+                  <c:pt idx="5">
+                    <c:v>2.5</c:v>
+                  </c:pt>
+                  <c:pt idx="6">
+                    <c:v>2.36</c:v>
+                  </c:pt>
+                  <c:pt idx="7">
+                    <c:v>2.2200000000000002</c:v>
+                  </c:pt>
+                  <c:pt idx="8">
+                    <c:v>2.08</c:v>
+                  </c:pt>
+                </c:numCache>
+              </c:numRef>
+            </c:plus>
+            <c:minus>
+              <c:numLit>
+                <c:formatCode>General</c:formatCode>
+                <c:ptCount val="1"/>
+                <c:pt idx="0">
+                  <c:v>1</c:v>
+                </c:pt>
+              </c:numLit>
+            </c:minus>
+          </c:errBars>
           <c:xVal>
             <c:strRef>
               <c:f>Sheet1!$A$3:$A$16</c:f>
@@ -5945,6 +5993,16 @@
         <c:majorTickMark val="out"/>
         <c:minorTickMark val="none"/>
         <c:tickLblPos val="nextTo"/>
+        <c:txPr>
+          <a:bodyPr rot="0" vert="horz"/>
+          <a:lstStyle/>
+          <a:p>
+            <a:pPr>
+              <a:defRPr/>
+            </a:pPr>
+            <a:endParaRPr lang="en-US"/>
+          </a:p>
+        </c:txPr>
         <c:crossAx val="2128456632"/>
         <c:crosses val="autoZero"/>
         <c:crossBetween val="midCat"/>
@@ -7046,7 +7104,7 @@
           <a:p>
             <a:fld id="{8D72D495-AFBC-D049-9D2A-D4CC16EF0503}" type="datetimeFigureOut">
               <a:rPr lang="en-US" smtClean="0"/>
-              <a:t>8/11/2017</a:t>
+              <a:t>8/21/2017</a:t>
             </a:fld>
             <a:endParaRPr lang="en-US"/>
           </a:p>
@@ -28082,7 +28140,7 @@
           <p:nvPr>
             <p:extLst>
               <p:ext uri="{D42A27DB-BD31-4B8C-83A1-F6EECF244321}">
-                <p14:modId xmlns:p14="http://schemas.microsoft.com/office/powerpoint/2010/main" val="2577681219"/>
+                <p14:modId xmlns:p14="http://schemas.microsoft.com/office/powerpoint/2010/main" val="865555579"/>
               </p:ext>
             </p:extLst>
           </p:nvPr>
@@ -28119,6 +28177,13 @@
       </p:transition>
     </mc:Fallback>
   </mc:AlternateContent>
+  <p:timing>
+    <p:tnLst>
+      <p:par>
+        <p:cTn id="1" dur="indefinite" restart="never" nodeType="tmRoot"/>
+      </p:par>
+    </p:tnLst>
+  </p:timing>
 </p:sld>
 </file>
 

</xml_diff>